<commit_message>
Brain tumor segmentation using k means algorithm
</commit_message>
<xml_diff>
--- a/brain tumor.pptx
+++ b/brain tumor.pptx
@@ -119,6 +119,22 @@
       </a:defRPr>
     </a:lvl9pPr>
   </p:defaultTextStyle>
+  <p:extLst>
+    <p:ext uri="{EFAFB233-063F-42B5-8137-9DF3F51BA10A}">
+      <p15:sldGuideLst xmlns:p15="http://schemas.microsoft.com/office/powerpoint/2012/main">
+        <p15:guide id="1" orient="horz" pos="2160">
+          <p15:clr>
+            <a:srgbClr val="A4A3A4"/>
+          </p15:clr>
+        </p15:guide>
+        <p15:guide id="2" pos="2880">
+          <p15:clr>
+            <a:srgbClr val="A4A3A4"/>
+          </p15:clr>
+        </p15:guide>
+      </p15:sldGuideLst>
+    </p:ext>
+  </p:extLst>
 </p:presentation>
 </file>
 
@@ -257,7 +273,7 @@
             <a:fld id="{54AB02A5-4FE5-49D9-9E24-09F23B90C450}" type="datetimeFigureOut">
               <a:rPr lang="en-US" smtClean="0"/>
               <a:pPr/>
-              <a:t>9/24/2013</a:t>
+              <a:t>2/16/2016</a:t>
             </a:fld>
             <a:endParaRPr lang="en-US"/>
           </a:p>
@@ -572,7 +588,7 @@
             <a:fld id="{54AB02A5-4FE5-49D9-9E24-09F23B90C450}" type="datetimeFigureOut">
               <a:rPr lang="en-US" smtClean="0"/>
               <a:pPr/>
-              <a:t>9/24/2013</a:t>
+              <a:t>2/16/2016</a:t>
             </a:fld>
             <a:endParaRPr lang="en-US"/>
           </a:p>
@@ -759,7 +775,7 @@
             <a:fld id="{54AB02A5-4FE5-49D9-9E24-09F23B90C450}" type="datetimeFigureOut">
               <a:rPr lang="en-US" smtClean="0"/>
               <a:pPr/>
-              <a:t>9/24/2013</a:t>
+              <a:t>2/16/2016</a:t>
             </a:fld>
             <a:endParaRPr lang="en-US"/>
           </a:p>
@@ -936,7 +952,7 @@
             <a:fld id="{54AB02A5-4FE5-49D9-9E24-09F23B90C450}" type="datetimeFigureOut">
               <a:rPr lang="en-US" smtClean="0"/>
               <a:pPr/>
-              <a:t>9/24/2013</a:t>
+              <a:t>2/16/2016</a:t>
             </a:fld>
             <a:endParaRPr lang="en-US"/>
           </a:p>
@@ -1206,7 +1222,7 @@
             <a:fld id="{54AB02A5-4FE5-49D9-9E24-09F23B90C450}" type="datetimeFigureOut">
               <a:rPr lang="en-US" smtClean="0"/>
               <a:pPr/>
-              <a:t>9/24/2013</a:t>
+              <a:t>2/16/2016</a:t>
             </a:fld>
             <a:endParaRPr lang="en-US"/>
           </a:p>
@@ -1676,7 +1692,7 @@
             <a:fld id="{54AB02A5-4FE5-49D9-9E24-09F23B90C450}" type="datetimeFigureOut">
               <a:rPr lang="en-US" smtClean="0"/>
               <a:pPr/>
-              <a:t>9/24/2013</a:t>
+              <a:t>2/16/2016</a:t>
             </a:fld>
             <a:endParaRPr lang="en-US"/>
           </a:p>
@@ -2167,7 +2183,7 @@
             <a:fld id="{54AB02A5-4FE5-49D9-9E24-09F23B90C450}" type="datetimeFigureOut">
               <a:rPr lang="en-US" smtClean="0"/>
               <a:pPr/>
-              <a:t>9/24/2013</a:t>
+              <a:t>2/16/2016</a:t>
             </a:fld>
             <a:endParaRPr lang="en-US"/>
           </a:p>
@@ -2295,7 +2311,7 @@
             <a:fld id="{54AB02A5-4FE5-49D9-9E24-09F23B90C450}" type="datetimeFigureOut">
               <a:rPr lang="en-US" smtClean="0"/>
               <a:pPr/>
-              <a:t>9/24/2013</a:t>
+              <a:t>2/16/2016</a:t>
             </a:fld>
             <a:endParaRPr lang="en-US"/>
           </a:p>
@@ -2441,7 +2457,7 @@
             <a:fld id="{54AB02A5-4FE5-49D9-9E24-09F23B90C450}" type="datetimeFigureOut">
               <a:rPr lang="en-US" smtClean="0"/>
               <a:pPr/>
-              <a:t>9/24/2013</a:t>
+              <a:t>2/16/2016</a:t>
             </a:fld>
             <a:endParaRPr lang="en-US"/>
           </a:p>
@@ -2765,7 +2781,7 @@
             <a:fld id="{54AB02A5-4FE5-49D9-9E24-09F23B90C450}" type="datetimeFigureOut">
               <a:rPr lang="en-US" smtClean="0"/>
               <a:pPr/>
-              <a:t>9/24/2013</a:t>
+              <a:t>2/16/2016</a:t>
             </a:fld>
             <a:endParaRPr lang="en-US"/>
           </a:p>
@@ -2901,7 +2917,7 @@
             <a:fld id="{54AB02A5-4FE5-49D9-9E24-09F23B90C450}" type="datetimeFigureOut">
               <a:rPr lang="en-US" smtClean="0"/>
               <a:pPr/>
-              <a:t>9/24/2013</a:t>
+              <a:t>2/16/2016</a:t>
             </a:fld>
             <a:endParaRPr lang="en-US"/>
           </a:p>
@@ -3685,7 +3701,7 @@
             <a:fld id="{54AB02A5-4FE5-49D9-9E24-09F23B90C450}" type="datetimeFigureOut">
               <a:rPr lang="en-US" smtClean="0"/>
               <a:pPr algn="r" eaLnBrk="1" latinLnBrk="0" hangingPunct="1"/>
-              <a:t>9/24/2013</a:t>
+              <a:t>2/16/2016</a:t>
             </a:fld>
             <a:endParaRPr lang="en-US" sz="1200">
               <a:solidFill>
@@ -4285,7 +4301,7 @@
     </p:spTree>
     <p:extLst>
       <p:ext uri="{BB962C8B-B14F-4D97-AF65-F5344CB8AC3E}">
-        <p14:creationId xmlns:p14="http://schemas.microsoft.com/office/powerpoint/2010/main" xmlns="" val="1803414182"/>
+        <p14:creationId xmlns:p14="http://schemas.microsoft.com/office/powerpoint/2010/main" val="1803414182"/>
       </p:ext>
     </p:extLst>
   </p:cSld>
@@ -4331,7 +4347,7 @@
           <a:blip r:embed="rId2" cstate="print">
             <a:extLst>
               <a:ext uri="{28A0092B-C50C-407E-A947-70E740481C1C}">
-                <a14:useLocalDpi xmlns:a14="http://schemas.microsoft.com/office/drawing/2010/main" xmlns="" val="0"/>
+                <a14:useLocalDpi xmlns:a14="http://schemas.microsoft.com/office/drawing/2010/main" val="0"/>
               </a:ext>
             </a:extLst>
           </a:blip>
@@ -4354,14 +4370,14 @@
           </a:ln>
           <a:extLst>
             <a:ext uri="{909E8E84-426E-40DD-AFC4-6F175D3DCCD1}">
-              <a14:hiddenFill xmlns:a14="http://schemas.microsoft.com/office/drawing/2010/main" xmlns="">
+              <a14:hiddenFill xmlns:a14="http://schemas.microsoft.com/office/drawing/2010/main">
                 <a:solidFill>
                   <a:schemeClr val="accent1"/>
                 </a:solidFill>
               </a14:hiddenFill>
             </a:ext>
             <a:ext uri="{91240B29-F687-4F45-9708-019B960494DF}">
-              <a14:hiddenLine xmlns:a14="http://schemas.microsoft.com/office/drawing/2010/main" xmlns="" w="9525">
+              <a14:hiddenLine xmlns:a14="http://schemas.microsoft.com/office/drawing/2010/main" w="9525">
                 <a:solidFill>
                   <a:schemeClr val="tx1"/>
                 </a:solidFill>
@@ -4444,7 +4460,7 @@
     </p:spTree>
     <p:extLst>
       <p:ext uri="{BB962C8B-B14F-4D97-AF65-F5344CB8AC3E}">
-        <p14:creationId xmlns:p14="http://schemas.microsoft.com/office/powerpoint/2010/main" xmlns="" val="1222133936"/>
+        <p14:creationId xmlns:p14="http://schemas.microsoft.com/office/powerpoint/2010/main" val="1222133936"/>
       </p:ext>
     </p:extLst>
   </p:cSld>
@@ -4615,7 +4631,7 @@
           <a:blip r:embed="rId2" cstate="print">
             <a:extLst>
               <a:ext uri="{28A0092B-C50C-407E-A947-70E740481C1C}">
-                <a14:useLocalDpi xmlns:a14="http://schemas.microsoft.com/office/drawing/2010/main" xmlns="" val="0"/>
+                <a14:useLocalDpi xmlns:a14="http://schemas.microsoft.com/office/drawing/2010/main" val="0"/>
               </a:ext>
             </a:extLst>
           </a:blip>
@@ -4638,14 +4654,14 @@
           </a:ln>
           <a:extLst>
             <a:ext uri="{909E8E84-426E-40DD-AFC4-6F175D3DCCD1}">
-              <a14:hiddenFill xmlns:a14="http://schemas.microsoft.com/office/drawing/2010/main" xmlns="">
+              <a14:hiddenFill xmlns:a14="http://schemas.microsoft.com/office/drawing/2010/main">
                 <a:solidFill>
                   <a:schemeClr val="accent1"/>
                 </a:solidFill>
               </a14:hiddenFill>
             </a:ext>
             <a:ext uri="{91240B29-F687-4F45-9708-019B960494DF}">
-              <a14:hiddenLine xmlns:a14="http://schemas.microsoft.com/office/drawing/2010/main" xmlns="" w="9525">
+              <a14:hiddenLine xmlns:a14="http://schemas.microsoft.com/office/drawing/2010/main" w="9525">
                 <a:solidFill>
                   <a:schemeClr val="tx1"/>
                 </a:solidFill>
@@ -4660,7 +4676,7 @@
     </p:spTree>
     <p:extLst>
       <p:ext uri="{BB962C8B-B14F-4D97-AF65-F5344CB8AC3E}">
-        <p14:creationId xmlns:p14="http://schemas.microsoft.com/office/powerpoint/2010/main" xmlns="" val="536737757"/>
+        <p14:creationId xmlns:p14="http://schemas.microsoft.com/office/powerpoint/2010/main" val="536737757"/>
       </p:ext>
     </p:extLst>
   </p:cSld>
@@ -4744,7 +4760,7 @@
           <a:blip r:embed="rId2" cstate="print">
             <a:extLst>
               <a:ext uri="{28A0092B-C50C-407E-A947-70E740481C1C}">
-                <a14:useLocalDpi xmlns:a14="http://schemas.microsoft.com/office/drawing/2010/main" xmlns="" val="0"/>
+                <a14:useLocalDpi xmlns:a14="http://schemas.microsoft.com/office/drawing/2010/main" val="0"/>
               </a:ext>
             </a:extLst>
           </a:blip>
@@ -4767,14 +4783,14 @@
           </a:ln>
           <a:extLst>
             <a:ext uri="{909E8E84-426E-40DD-AFC4-6F175D3DCCD1}">
-              <a14:hiddenFill xmlns:a14="http://schemas.microsoft.com/office/drawing/2010/main" xmlns="">
+              <a14:hiddenFill xmlns:a14="http://schemas.microsoft.com/office/drawing/2010/main">
                 <a:solidFill>
                   <a:schemeClr val="accent1"/>
                 </a:solidFill>
               </a14:hiddenFill>
             </a:ext>
             <a:ext uri="{91240B29-F687-4F45-9708-019B960494DF}">
-              <a14:hiddenLine xmlns:a14="http://schemas.microsoft.com/office/drawing/2010/main" xmlns="" w="9525">
+              <a14:hiddenLine xmlns:a14="http://schemas.microsoft.com/office/drawing/2010/main" w="9525">
                 <a:solidFill>
                   <a:schemeClr val="tx1"/>
                 </a:solidFill>
@@ -4798,7 +4814,7 @@
           <a:blip r:embed="rId3" cstate="print">
             <a:extLst>
               <a:ext uri="{28A0092B-C50C-407E-A947-70E740481C1C}">
-                <a14:useLocalDpi xmlns:a14="http://schemas.microsoft.com/office/drawing/2010/main" xmlns="" val="0"/>
+                <a14:useLocalDpi xmlns:a14="http://schemas.microsoft.com/office/drawing/2010/main" val="0"/>
               </a:ext>
             </a:extLst>
           </a:blip>
@@ -4821,14 +4837,14 @@
           </a:ln>
           <a:extLst>
             <a:ext uri="{909E8E84-426E-40DD-AFC4-6F175D3DCCD1}">
-              <a14:hiddenFill xmlns:a14="http://schemas.microsoft.com/office/drawing/2010/main" xmlns="">
+              <a14:hiddenFill xmlns:a14="http://schemas.microsoft.com/office/drawing/2010/main">
                 <a:solidFill>
                   <a:schemeClr val="accent1"/>
                 </a:solidFill>
               </a14:hiddenFill>
             </a:ext>
             <a:ext uri="{91240B29-F687-4F45-9708-019B960494DF}">
-              <a14:hiddenLine xmlns:a14="http://schemas.microsoft.com/office/drawing/2010/main" xmlns="" w="9525">
+              <a14:hiddenLine xmlns:a14="http://schemas.microsoft.com/office/drawing/2010/main" w="9525">
                 <a:solidFill>
                   <a:schemeClr val="tx1"/>
                 </a:solidFill>
@@ -5217,7 +5233,7 @@
     </p:spTree>
     <p:extLst>
       <p:ext uri="{BB962C8B-B14F-4D97-AF65-F5344CB8AC3E}">
-        <p14:creationId xmlns:p14="http://schemas.microsoft.com/office/powerpoint/2010/main" xmlns="" val="2842049050"/>
+        <p14:creationId xmlns:p14="http://schemas.microsoft.com/office/powerpoint/2010/main" val="2842049050"/>
       </p:ext>
     </p:extLst>
   </p:cSld>
@@ -5263,7 +5279,7 @@
           <a:blip r:embed="rId2" cstate="print">
             <a:extLst>
               <a:ext uri="{28A0092B-C50C-407E-A947-70E740481C1C}">
-                <a14:useLocalDpi xmlns:a14="http://schemas.microsoft.com/office/drawing/2010/main" xmlns="" val="0"/>
+                <a14:useLocalDpi xmlns:a14="http://schemas.microsoft.com/office/drawing/2010/main" val="0"/>
               </a:ext>
             </a:extLst>
           </a:blip>
@@ -5286,14 +5302,14 @@
           </a:ln>
           <a:extLst>
             <a:ext uri="{909E8E84-426E-40DD-AFC4-6F175D3DCCD1}">
-              <a14:hiddenFill xmlns:a14="http://schemas.microsoft.com/office/drawing/2010/main" xmlns="">
+              <a14:hiddenFill xmlns:a14="http://schemas.microsoft.com/office/drawing/2010/main">
                 <a:solidFill>
                   <a:schemeClr val="accent1"/>
                 </a:solidFill>
               </a14:hiddenFill>
             </a:ext>
             <a:ext uri="{91240B29-F687-4F45-9708-019B960494DF}">
-              <a14:hiddenLine xmlns:a14="http://schemas.microsoft.com/office/drawing/2010/main" xmlns="" w="9525">
+              <a14:hiddenLine xmlns:a14="http://schemas.microsoft.com/office/drawing/2010/main" w="9525">
                 <a:solidFill>
                   <a:schemeClr val="tx1"/>
                 </a:solidFill>
@@ -5376,7 +5392,7 @@
     </p:spTree>
     <p:extLst>
       <p:ext uri="{BB962C8B-B14F-4D97-AF65-F5344CB8AC3E}">
-        <p14:creationId xmlns:p14="http://schemas.microsoft.com/office/powerpoint/2010/main" xmlns="" val="1160792849"/>
+        <p14:creationId xmlns:p14="http://schemas.microsoft.com/office/powerpoint/2010/main" val="1160792849"/>
       </p:ext>
     </p:extLst>
   </p:cSld>
@@ -5891,7 +5907,7 @@
     </p:spTree>
     <p:extLst>
       <p:ext uri="{BB962C8B-B14F-4D97-AF65-F5344CB8AC3E}">
-        <p14:creationId xmlns:p14="http://schemas.microsoft.com/office/powerpoint/2010/main" xmlns="" val="1755410360"/>
+        <p14:creationId xmlns:p14="http://schemas.microsoft.com/office/powerpoint/2010/main" val="1755410360"/>
       </p:ext>
     </p:extLst>
   </p:cSld>
@@ -6447,7 +6463,7 @@
     </p:spTree>
     <p:extLst>
       <p:ext uri="{BB962C8B-B14F-4D97-AF65-F5344CB8AC3E}">
-        <p14:creationId xmlns:p14="http://schemas.microsoft.com/office/powerpoint/2010/main" xmlns="" val="3588245608"/>
+        <p14:creationId xmlns:p14="http://schemas.microsoft.com/office/powerpoint/2010/main" val="3588245608"/>
       </p:ext>
     </p:extLst>
   </p:cSld>
@@ -6520,7 +6536,7 @@
     </p:spTree>
     <p:extLst>
       <p:ext uri="{BB962C8B-B14F-4D97-AF65-F5344CB8AC3E}">
-        <p14:creationId xmlns:p14="http://schemas.microsoft.com/office/powerpoint/2010/main" xmlns="" val="1504438796"/>
+        <p14:creationId xmlns:p14="http://schemas.microsoft.com/office/powerpoint/2010/main" val="1504438796"/>
       </p:ext>
     </p:extLst>
   </p:cSld>
@@ -6853,7 +6869,7 @@
     </p:spTree>
     <p:extLst>
       <p:ext uri="{BB962C8B-B14F-4D97-AF65-F5344CB8AC3E}">
-        <p14:creationId xmlns:p14="http://schemas.microsoft.com/office/powerpoint/2010/main" xmlns="" val="419648853"/>
+        <p14:creationId xmlns:p14="http://schemas.microsoft.com/office/powerpoint/2010/main" val="419648853"/>
       </p:ext>
     </p:extLst>
   </p:cSld>
@@ -7152,7 +7168,7 @@
     </p:spTree>
     <p:extLst>
       <p:ext uri="{BB962C8B-B14F-4D97-AF65-F5344CB8AC3E}">
-        <p14:creationId xmlns:p14="http://schemas.microsoft.com/office/powerpoint/2010/main" xmlns="" val="2921590524"/>
+        <p14:creationId xmlns:p14="http://schemas.microsoft.com/office/powerpoint/2010/main" val="2921590524"/>
       </p:ext>
     </p:extLst>
   </p:cSld>
@@ -7195,7 +7211,7 @@
         <p:spPr>
           <a:xfrm>
             <a:off x="1187624" y="556225"/>
-            <a:ext cx="6318448" cy="2800767"/>
+            <a:ext cx="6318448" cy="2554545"/>
           </a:xfrm>
           <a:prstGeom prst="rect">
             <a:avLst/>
@@ -7216,7 +7232,21 @@
                 <a:latin typeface="Times New Roman" pitchFamily="18" charset="0"/>
                 <a:cs typeface="Times New Roman" pitchFamily="18" charset="0"/>
               </a:rPr>
-              <a:t>The existing method is based on the thresholding and region growing. The thresholding method was ignored the spatial characteristics. Normally spatial characteristics are important for the malignant tumor </a:t>
+              <a:t>The existing method is based on the thresholding and region growing. The thresholding method </a:t>
+            </a:r>
+            <a:r>
+              <a:rPr lang="en-IN" sz="1600" dirty="0" smtClean="0">
+                <a:latin typeface="Times New Roman" pitchFamily="18" charset="0"/>
+                <a:cs typeface="Times New Roman" pitchFamily="18" charset="0"/>
+              </a:rPr>
+              <a:t>ignored </a:t>
+            </a:r>
+            <a:r>
+              <a:rPr lang="en-IN" sz="1600" dirty="0">
+                <a:latin typeface="Times New Roman" pitchFamily="18" charset="0"/>
+                <a:cs typeface="Times New Roman" pitchFamily="18" charset="0"/>
+              </a:rPr>
+              <a:t>the spatial characteristics. Normally spatial characteristics are important for the malignant tumor </a:t>
             </a:r>
             <a:r>
               <a:rPr lang="en-IN" sz="1600" dirty="0" smtClean="0">
@@ -7346,7 +7376,7 @@
           <a:blip r:embed="rId2" cstate="print">
             <a:extLst>
               <a:ext uri="{28A0092B-C50C-407E-A947-70E740481C1C}">
-                <a14:useLocalDpi xmlns:a14="http://schemas.microsoft.com/office/drawing/2010/main" xmlns="" val="0"/>
+                <a14:useLocalDpi xmlns:a14="http://schemas.microsoft.com/office/drawing/2010/main" val="0"/>
               </a:ext>
             </a:extLst>
           </a:blip>
@@ -7369,14 +7399,14 @@
           </a:ln>
           <a:extLst>
             <a:ext uri="{909E8E84-426E-40DD-AFC4-6F175D3DCCD1}">
-              <a14:hiddenFill xmlns:a14="http://schemas.microsoft.com/office/drawing/2010/main" xmlns="">
+              <a14:hiddenFill xmlns:a14="http://schemas.microsoft.com/office/drawing/2010/main">
                 <a:solidFill>
                   <a:schemeClr val="accent1"/>
                 </a:solidFill>
               </a14:hiddenFill>
             </a:ext>
             <a:ext uri="{91240B29-F687-4F45-9708-019B960494DF}">
-              <a14:hiddenLine xmlns:a14="http://schemas.microsoft.com/office/drawing/2010/main" xmlns="" w="9525">
+              <a14:hiddenLine xmlns:a14="http://schemas.microsoft.com/office/drawing/2010/main" w="9525">
                 <a:solidFill>
                   <a:schemeClr val="tx1"/>
                 </a:solidFill>
@@ -7474,11 +7504,18 @@
               <a:t>the MR image </a:t>
             </a:r>
             <a:r>
+              <a:rPr lang="en-IN" sz="1600" dirty="0" smtClean="0">
+                <a:latin typeface="Times New Roman" pitchFamily="18" charset="0"/>
+                <a:cs typeface="Times New Roman" pitchFamily="18" charset="0"/>
+              </a:rPr>
+              <a:t>itself </a:t>
+            </a:r>
+            <a:r>
               <a:rPr lang="en-IN" sz="1600" dirty="0">
                 <a:latin typeface="Times New Roman" pitchFamily="18" charset="0"/>
                 <a:cs typeface="Times New Roman" pitchFamily="18" charset="0"/>
               </a:rPr>
-              <a:t>it self we can see the tumor area but it is </a:t>
+              <a:t>we can see the tumor area but it is </a:t>
             </a:r>
             <a:r>
               <a:rPr lang="en-IN" sz="1600" dirty="0" smtClean="0">
@@ -7627,7 +7664,7 @@
     </p:spTree>
     <p:extLst>
       <p:ext uri="{BB962C8B-B14F-4D97-AF65-F5344CB8AC3E}">
-        <p14:creationId xmlns:p14="http://schemas.microsoft.com/office/powerpoint/2010/main" xmlns="" val="811307499"/>
+        <p14:creationId xmlns:p14="http://schemas.microsoft.com/office/powerpoint/2010/main" val="811307499"/>
       </p:ext>
     </p:extLst>
   </p:cSld>
@@ -7745,7 +7782,7 @@
           <a:blip r:embed="rId2" cstate="print">
             <a:extLst>
               <a:ext uri="{28A0092B-C50C-407E-A947-70E740481C1C}">
-                <a14:useLocalDpi xmlns:a14="http://schemas.microsoft.com/office/drawing/2010/main" xmlns="" val="0"/>
+                <a14:useLocalDpi xmlns:a14="http://schemas.microsoft.com/office/drawing/2010/main" val="0"/>
               </a:ext>
             </a:extLst>
           </a:blip>
@@ -7768,14 +7805,14 @@
           </a:ln>
           <a:extLst>
             <a:ext uri="{909E8E84-426E-40DD-AFC4-6F175D3DCCD1}">
-              <a14:hiddenFill xmlns:a14="http://schemas.microsoft.com/office/drawing/2010/main" xmlns="">
+              <a14:hiddenFill xmlns:a14="http://schemas.microsoft.com/office/drawing/2010/main">
                 <a:solidFill>
                   <a:schemeClr val="accent1"/>
                 </a:solidFill>
               </a14:hiddenFill>
             </a:ext>
             <a:ext uri="{91240B29-F687-4F45-9708-019B960494DF}">
-              <a14:hiddenLine xmlns:a14="http://schemas.microsoft.com/office/drawing/2010/main" xmlns="" w="9525">
+              <a14:hiddenLine xmlns:a14="http://schemas.microsoft.com/office/drawing/2010/main" w="9525">
                 <a:solidFill>
                   <a:schemeClr val="tx1"/>
                 </a:solidFill>
@@ -7790,7 +7827,7 @@
     </p:spTree>
     <p:extLst>
       <p:ext uri="{BB962C8B-B14F-4D97-AF65-F5344CB8AC3E}">
-        <p14:creationId xmlns:p14="http://schemas.microsoft.com/office/powerpoint/2010/main" xmlns="" val="2907862402"/>
+        <p14:creationId xmlns:p14="http://schemas.microsoft.com/office/powerpoint/2010/main" val="2907862402"/>
       </p:ext>
     </p:extLst>
   </p:cSld>
@@ -7888,18 +7925,25 @@
               <a:t>and other </a:t>
             </a:r>
             <a:r>
-              <a:rPr lang="en-IN" dirty="0" err="1">
+              <a:rPr lang="en-IN" dirty="0" err="1" smtClean="0">
                 <a:latin typeface="Times New Roman" pitchFamily="18" charset="0"/>
                 <a:cs typeface="Times New Roman" pitchFamily="18" charset="0"/>
               </a:rPr>
               <a:t>artifacts</a:t>
             </a:r>
             <a:r>
+              <a:rPr lang="en-IN" dirty="0" smtClean="0">
+                <a:latin typeface="Times New Roman" pitchFamily="18" charset="0"/>
+                <a:cs typeface="Times New Roman" pitchFamily="18" charset="0"/>
+              </a:rPr>
+              <a:t> </a:t>
+            </a:r>
+            <a:r>
               <a:rPr lang="en-IN" dirty="0">
                 <a:latin typeface="Times New Roman" pitchFamily="18" charset="0"/>
                 <a:cs typeface="Times New Roman" pitchFamily="18" charset="0"/>
               </a:rPr>
-              <a:t> in the image and sharpening </a:t>
+              <a:t>in the image and sharpening </a:t>
             </a:r>
             <a:r>
               <a:rPr lang="en-IN" dirty="0" smtClean="0">
@@ -8059,7 +8103,21 @@
                 <a:latin typeface="Times New Roman" pitchFamily="18" charset="0"/>
                 <a:cs typeface="Times New Roman" pitchFamily="18" charset="0"/>
               </a:rPr>
-              <a:t>main aim of this paper is to detect </a:t>
+              <a:t>main aim of this </a:t>
+            </a:r>
+            <a:r>
+              <a:rPr lang="en-IN" dirty="0" smtClean="0">
+                <a:latin typeface="Times New Roman" pitchFamily="18" charset="0"/>
+                <a:cs typeface="Times New Roman" pitchFamily="18" charset="0"/>
+              </a:rPr>
+              <a:t>project </a:t>
+            </a:r>
+            <a:r>
+              <a:rPr lang="en-IN" dirty="0">
+                <a:latin typeface="Times New Roman" pitchFamily="18" charset="0"/>
+                <a:cs typeface="Times New Roman" pitchFamily="18" charset="0"/>
+              </a:rPr>
+              <a:t>is to detect </a:t>
             </a:r>
             <a:r>
               <a:rPr lang="en-IN" dirty="0" smtClean="0">
@@ -8124,7 +8182,14 @@
                 <a:latin typeface="Times New Roman" pitchFamily="18" charset="0"/>
                 <a:cs typeface="Times New Roman" pitchFamily="18" charset="0"/>
               </a:rPr>
-              <a:t>For better understanding </a:t>
+              <a:t>For better </a:t>
+            </a:r>
+            <a:r>
+              <a:rPr lang="en-IN" dirty="0" smtClean="0">
+                <a:latin typeface="Times New Roman" pitchFamily="18" charset="0"/>
+                <a:cs typeface="Times New Roman" pitchFamily="18" charset="0"/>
+              </a:rPr>
+              <a:t>understanding of </a:t>
             </a:r>
             <a:r>
               <a:rPr lang="en-IN" dirty="0">
@@ -8178,7 +8243,7 @@
     </p:spTree>
     <p:extLst>
       <p:ext uri="{BB962C8B-B14F-4D97-AF65-F5344CB8AC3E}">
-        <p14:creationId xmlns:p14="http://schemas.microsoft.com/office/powerpoint/2010/main" xmlns="" val="2871842041"/>
+        <p14:creationId xmlns:p14="http://schemas.microsoft.com/office/powerpoint/2010/main" val="2871842041"/>
       </p:ext>
     </p:extLst>
   </p:cSld>
@@ -8224,7 +8289,7 @@
           <a:blip r:embed="rId2" cstate="print">
             <a:extLst>
               <a:ext uri="{28A0092B-C50C-407E-A947-70E740481C1C}">
-                <a14:useLocalDpi xmlns:a14="http://schemas.microsoft.com/office/drawing/2010/main" xmlns="" val="0"/>
+                <a14:useLocalDpi xmlns:a14="http://schemas.microsoft.com/office/drawing/2010/main" val="0"/>
               </a:ext>
             </a:extLst>
           </a:blip>
@@ -8252,7 +8317,7 @@
           </a:ln>
           <a:extLst>
             <a:ext uri="{909E8E84-426E-40DD-AFC4-6F175D3DCCD1}">
-              <a14:hiddenFill xmlns:a14="http://schemas.microsoft.com/office/drawing/2010/main" xmlns="">
+              <a14:hiddenFill xmlns:a14="http://schemas.microsoft.com/office/drawing/2010/main">
                 <a:solidFill>
                   <a:schemeClr val="accent1"/>
                 </a:solidFill>
@@ -8322,7 +8387,7 @@
           <a:blip r:embed="rId3" cstate="print">
             <a:extLst>
               <a:ext uri="{28A0092B-C50C-407E-A947-70E740481C1C}">
-                <a14:useLocalDpi xmlns:a14="http://schemas.microsoft.com/office/drawing/2010/main" xmlns="" val="0"/>
+                <a14:useLocalDpi xmlns:a14="http://schemas.microsoft.com/office/drawing/2010/main" val="0"/>
               </a:ext>
             </a:extLst>
           </a:blip>
@@ -8345,14 +8410,14 @@
           </a:ln>
           <a:extLst>
             <a:ext uri="{909E8E84-426E-40DD-AFC4-6F175D3DCCD1}">
-              <a14:hiddenFill xmlns:a14="http://schemas.microsoft.com/office/drawing/2010/main" xmlns="">
+              <a14:hiddenFill xmlns:a14="http://schemas.microsoft.com/office/drawing/2010/main">
                 <a:solidFill>
                   <a:schemeClr val="accent1"/>
                 </a:solidFill>
               </a14:hiddenFill>
             </a:ext>
             <a:ext uri="{91240B29-F687-4F45-9708-019B960494DF}">
-              <a14:hiddenLine xmlns:a14="http://schemas.microsoft.com/office/drawing/2010/main" xmlns="" w="9525">
+              <a14:hiddenLine xmlns:a14="http://schemas.microsoft.com/office/drawing/2010/main" w="9525">
                 <a:solidFill>
                   <a:schemeClr val="tx1"/>
                 </a:solidFill>
@@ -8367,7 +8432,7 @@
     </p:spTree>
     <p:extLst>
       <p:ext uri="{BB962C8B-B14F-4D97-AF65-F5344CB8AC3E}">
-        <p14:creationId xmlns:p14="http://schemas.microsoft.com/office/powerpoint/2010/main" xmlns="" val="663620803"/>
+        <p14:creationId xmlns:p14="http://schemas.microsoft.com/office/powerpoint/2010/main" val="663620803"/>
       </p:ext>
     </p:extLst>
   </p:cSld>
@@ -8453,7 +8518,7 @@
           <a:blip r:embed="rId2" cstate="print">
             <a:extLst>
               <a:ext uri="{28A0092B-C50C-407E-A947-70E740481C1C}">
-                <a14:useLocalDpi xmlns:a14="http://schemas.microsoft.com/office/drawing/2010/main" xmlns="" val="0"/>
+                <a14:useLocalDpi xmlns:a14="http://schemas.microsoft.com/office/drawing/2010/main" val="0"/>
               </a:ext>
             </a:extLst>
           </a:blip>
@@ -8476,14 +8541,14 @@
           </a:ln>
           <a:extLst>
             <a:ext uri="{909E8E84-426E-40DD-AFC4-6F175D3DCCD1}">
-              <a14:hiddenFill xmlns:a14="http://schemas.microsoft.com/office/drawing/2010/main" xmlns="">
+              <a14:hiddenFill xmlns:a14="http://schemas.microsoft.com/office/drawing/2010/main">
                 <a:solidFill>
                   <a:schemeClr val="accent1"/>
                 </a:solidFill>
               </a14:hiddenFill>
             </a:ext>
             <a:ext uri="{91240B29-F687-4F45-9708-019B960494DF}">
-              <a14:hiddenLine xmlns:a14="http://schemas.microsoft.com/office/drawing/2010/main" xmlns="" w="9525">
+              <a14:hiddenLine xmlns:a14="http://schemas.microsoft.com/office/drawing/2010/main" w="9525">
                 <a:solidFill>
                   <a:schemeClr val="tx1"/>
                 </a:solidFill>
@@ -8627,7 +8692,7 @@
     </p:spTree>
     <p:extLst>
       <p:ext uri="{BB962C8B-B14F-4D97-AF65-F5344CB8AC3E}">
-        <p14:creationId xmlns:p14="http://schemas.microsoft.com/office/powerpoint/2010/main" xmlns="" val="3282400662"/>
+        <p14:creationId xmlns:p14="http://schemas.microsoft.com/office/powerpoint/2010/main" val="3282400662"/>
       </p:ext>
     </p:extLst>
   </p:cSld>
@@ -8783,7 +8848,7 @@
           <a:blip r:embed="rId2" cstate="print">
             <a:extLst>
               <a:ext uri="{28A0092B-C50C-407E-A947-70E740481C1C}">
-                <a14:useLocalDpi xmlns:a14="http://schemas.microsoft.com/office/drawing/2010/main" xmlns="" val="0"/>
+                <a14:useLocalDpi xmlns:a14="http://schemas.microsoft.com/office/drawing/2010/main" val="0"/>
               </a:ext>
             </a:extLst>
           </a:blip>
@@ -8806,14 +8871,14 @@
           </a:ln>
           <a:extLst>
             <a:ext uri="{909E8E84-426E-40DD-AFC4-6F175D3DCCD1}">
-              <a14:hiddenFill xmlns:a14="http://schemas.microsoft.com/office/drawing/2010/main" xmlns="">
+              <a14:hiddenFill xmlns:a14="http://schemas.microsoft.com/office/drawing/2010/main">
                 <a:solidFill>
                   <a:schemeClr val="accent1"/>
                 </a:solidFill>
               </a14:hiddenFill>
             </a:ext>
             <a:ext uri="{91240B29-F687-4F45-9708-019B960494DF}">
-              <a14:hiddenLine xmlns:a14="http://schemas.microsoft.com/office/drawing/2010/main" xmlns="" w="9525">
+              <a14:hiddenLine xmlns:a14="http://schemas.microsoft.com/office/drawing/2010/main" w="9525">
                 <a:solidFill>
                   <a:schemeClr val="tx1"/>
                 </a:solidFill>
@@ -8837,7 +8902,7 @@
           <a:blip r:embed="rId3" cstate="print">
             <a:extLst>
               <a:ext uri="{28A0092B-C50C-407E-A947-70E740481C1C}">
-                <a14:useLocalDpi xmlns:a14="http://schemas.microsoft.com/office/drawing/2010/main" xmlns="" val="0"/>
+                <a14:useLocalDpi xmlns:a14="http://schemas.microsoft.com/office/drawing/2010/main" val="0"/>
               </a:ext>
             </a:extLst>
           </a:blip>
@@ -8860,14 +8925,14 @@
           </a:ln>
           <a:extLst>
             <a:ext uri="{909E8E84-426E-40DD-AFC4-6F175D3DCCD1}">
-              <a14:hiddenFill xmlns:a14="http://schemas.microsoft.com/office/drawing/2010/main" xmlns="">
+              <a14:hiddenFill xmlns:a14="http://schemas.microsoft.com/office/drawing/2010/main">
                 <a:solidFill>
                   <a:schemeClr val="accent1"/>
                 </a:solidFill>
               </a14:hiddenFill>
             </a:ext>
             <a:ext uri="{91240B29-F687-4F45-9708-019B960494DF}">
-              <a14:hiddenLine xmlns:a14="http://schemas.microsoft.com/office/drawing/2010/main" xmlns="" w="9525">
+              <a14:hiddenLine xmlns:a14="http://schemas.microsoft.com/office/drawing/2010/main" w="9525">
                 <a:solidFill>
                   <a:schemeClr val="tx1"/>
                 </a:solidFill>
@@ -8891,7 +8956,7 @@
           <a:blip r:embed="rId4" cstate="print">
             <a:extLst>
               <a:ext uri="{28A0092B-C50C-407E-A947-70E740481C1C}">
-                <a14:useLocalDpi xmlns:a14="http://schemas.microsoft.com/office/drawing/2010/main" xmlns="" val="0"/>
+                <a14:useLocalDpi xmlns:a14="http://schemas.microsoft.com/office/drawing/2010/main" val="0"/>
               </a:ext>
             </a:extLst>
           </a:blip>
@@ -8914,14 +8979,14 @@
           </a:ln>
           <a:extLst>
             <a:ext uri="{909E8E84-426E-40DD-AFC4-6F175D3DCCD1}">
-              <a14:hiddenFill xmlns:a14="http://schemas.microsoft.com/office/drawing/2010/main" xmlns="">
+              <a14:hiddenFill xmlns:a14="http://schemas.microsoft.com/office/drawing/2010/main">
                 <a:solidFill>
                   <a:schemeClr val="accent1"/>
                 </a:solidFill>
               </a14:hiddenFill>
             </a:ext>
             <a:ext uri="{91240B29-F687-4F45-9708-019B960494DF}">
-              <a14:hiddenLine xmlns:a14="http://schemas.microsoft.com/office/drawing/2010/main" xmlns="" w="9525">
+              <a14:hiddenLine xmlns:a14="http://schemas.microsoft.com/office/drawing/2010/main" w="9525">
                 <a:solidFill>
                   <a:schemeClr val="tx1"/>
                 </a:solidFill>
@@ -8936,7 +9001,7 @@
     </p:spTree>
     <p:extLst>
       <p:ext uri="{BB962C8B-B14F-4D97-AF65-F5344CB8AC3E}">
-        <p14:creationId xmlns:p14="http://schemas.microsoft.com/office/powerpoint/2010/main" xmlns="" val="774574081"/>
+        <p14:creationId xmlns:p14="http://schemas.microsoft.com/office/powerpoint/2010/main" val="774574081"/>
       </p:ext>
     </p:extLst>
   </p:cSld>

</xml_diff>